<commit_message>
changed team size in intro, removed all keynote files
</commit_message>
<xml_diff>
--- a/slides/1_intro.pptx
+++ b/slides/1_intro.pptx
@@ -2136,7 +2136,7 @@
           </a:ln>
           <a:extLst>
             <a:ext uri="{C572A759-6A51-4108-AA02-DFA0A04FC94B}">
-              <ma14:wrappingTextBoxFlag xmlns:ma14="http://schemas.microsoft.com/office/mac/drawingml/2011/main" xmlns="" val="1"/>
+              <ma14:wrappingTextBoxFlag xmlns="" xmlns:ma14="http://schemas.microsoft.com/office/mac/drawingml/2011/main" val="1"/>
             </a:ext>
           </a:extLst>
         </p:spPr>
@@ -2175,7 +2175,7 @@
           </a:ln>
           <a:extLst>
             <a:ext uri="{C572A759-6A51-4108-AA02-DFA0A04FC94B}">
-              <ma14:wrappingTextBoxFlag xmlns:ma14="http://schemas.microsoft.com/office/mac/drawingml/2011/main" xmlns="" val="1"/>
+              <ma14:wrappingTextBoxFlag xmlns="" xmlns:ma14="http://schemas.microsoft.com/office/mac/drawingml/2011/main" val="1"/>
             </a:ext>
           </a:extLst>
         </p:spPr>
@@ -3226,7 +3226,7 @@
           </a:ln>
           <a:extLst>
             <a:ext uri="{C572A759-6A51-4108-AA02-DFA0A04FC94B}">
-              <ma14:wrappingTextBoxFlag xmlns:ma14="http://schemas.microsoft.com/office/mac/drawingml/2011/main" xmlns="" val="1"/>
+              <ma14:wrappingTextBoxFlag xmlns="" xmlns:ma14="http://schemas.microsoft.com/office/mac/drawingml/2011/main" val="1"/>
             </a:ext>
           </a:extLst>
         </p:spPr>
@@ -3558,7 +3558,7 @@
             </a:r>
             <a:r>
               <a:rPr lang="en-GB" dirty="0"/>
-              <a:t> 4/5 members</a:t>
+              <a:t> ~4 members</a:t>
             </a:r>
           </a:p>
         </p:txBody>

</xml_diff>